<commit_message>
V3 dev merge (#5)
* dev initial

* dev

* dev

* dev

* dev

* dev

* dev

* dev

* preparing v3.0

* dev

* preparing v3.0

* refactor lazy polars

* show polar op points

* blend SD7003 - thanks Thomas!

* popen Windows conditionals - thanks Thomas

* preparing beta 2

* fix logging

* refactor subprocess call

to align better with LINUX (?)

* scale re

* fix exe directory

* re_scale

* asyncio tests

* refactoring polar generation

* cleaning

* Update airfoil_test.py

* code cleanings

* cleanup file functions

* fix example airfoil

* Update airfoil_examples.py

* blend label

* refactor Artist refresh

* polar error handling

* refresh polar defs

* code cleaning

* code cleaning

* bezier sanity file check - thanks Martin!

* UI tweaks

* Improved Worker check

* preparing 3.0
</commit_message>
<xml_diff>
--- a/dev/UI_Drafts.pptx
+++ b/dev/UI_Drafts.pptx
@@ -5,11 +5,12 @@
     <p:sldMasterId id="2147483648" r:id="rId1"/>
   </p:sldMasterIdLst>
   <p:sldIdLst>
-    <p:sldId id="257" r:id="rId2"/>
-    <p:sldId id="258" r:id="rId3"/>
-    <p:sldId id="262" r:id="rId4"/>
-    <p:sldId id="263" r:id="rId5"/>
-    <p:sldId id="259" r:id="rId6"/>
+    <p:sldId id="259" r:id="rId2"/>
+    <p:sldId id="280" r:id="rId3"/>
+    <p:sldId id="257" r:id="rId4"/>
+    <p:sldId id="258" r:id="rId5"/>
+    <p:sldId id="262" r:id="rId6"/>
+    <p:sldId id="263" r:id="rId7"/>
   </p:sldIdLst>
   <p:sldSz cx="12192000" cy="6858000"/>
   <p:notesSz cx="6858000" cy="9144000"/>
@@ -276,7 +277,7 @@
           <a:p>
             <a:fld id="{CE8103EF-6A06-4AFC-A2C6-FF5735AE5867}" type="datetimeFigureOut">
               <a:rPr lang="en-US" smtClean="0"/>
-              <a:t>9/1/2024</a:t>
+              <a:t>1/14/2025</a:t>
             </a:fld>
             <a:endParaRPr lang="en-US"/>
           </a:p>
@@ -476,7 +477,7 @@
           <a:p>
             <a:fld id="{CE8103EF-6A06-4AFC-A2C6-FF5735AE5867}" type="datetimeFigureOut">
               <a:rPr lang="en-US" smtClean="0"/>
-              <a:t>9/1/2024</a:t>
+              <a:t>1/14/2025</a:t>
             </a:fld>
             <a:endParaRPr lang="en-US"/>
           </a:p>
@@ -686,7 +687,7 @@
           <a:p>
             <a:fld id="{CE8103EF-6A06-4AFC-A2C6-FF5735AE5867}" type="datetimeFigureOut">
               <a:rPr lang="en-US" smtClean="0"/>
-              <a:t>9/1/2024</a:t>
+              <a:t>1/14/2025</a:t>
             </a:fld>
             <a:endParaRPr lang="en-US"/>
           </a:p>
@@ -886,7 +887,7 @@
           <a:p>
             <a:fld id="{CE8103EF-6A06-4AFC-A2C6-FF5735AE5867}" type="datetimeFigureOut">
               <a:rPr lang="en-US" smtClean="0"/>
-              <a:t>9/1/2024</a:t>
+              <a:t>1/14/2025</a:t>
             </a:fld>
             <a:endParaRPr lang="en-US"/>
           </a:p>
@@ -1162,7 +1163,7 @@
           <a:p>
             <a:fld id="{CE8103EF-6A06-4AFC-A2C6-FF5735AE5867}" type="datetimeFigureOut">
               <a:rPr lang="en-US" smtClean="0"/>
-              <a:t>9/1/2024</a:t>
+              <a:t>1/14/2025</a:t>
             </a:fld>
             <a:endParaRPr lang="en-US"/>
           </a:p>
@@ -1430,7 +1431,7 @@
           <a:p>
             <a:fld id="{CE8103EF-6A06-4AFC-A2C6-FF5735AE5867}" type="datetimeFigureOut">
               <a:rPr lang="en-US" smtClean="0"/>
-              <a:t>9/1/2024</a:t>
+              <a:t>1/14/2025</a:t>
             </a:fld>
             <a:endParaRPr lang="en-US"/>
           </a:p>
@@ -1845,7 +1846,7 @@
           <a:p>
             <a:fld id="{CE8103EF-6A06-4AFC-A2C6-FF5735AE5867}" type="datetimeFigureOut">
               <a:rPr lang="en-US" smtClean="0"/>
-              <a:t>9/1/2024</a:t>
+              <a:t>1/14/2025</a:t>
             </a:fld>
             <a:endParaRPr lang="en-US"/>
           </a:p>
@@ -1987,7 +1988,7 @@
           <a:p>
             <a:fld id="{CE8103EF-6A06-4AFC-A2C6-FF5735AE5867}" type="datetimeFigureOut">
               <a:rPr lang="en-US" smtClean="0"/>
-              <a:t>9/1/2024</a:t>
+              <a:t>1/14/2025</a:t>
             </a:fld>
             <a:endParaRPr lang="en-US"/>
           </a:p>
@@ -2100,7 +2101,7 @@
           <a:p>
             <a:fld id="{CE8103EF-6A06-4AFC-A2C6-FF5735AE5867}" type="datetimeFigureOut">
               <a:rPr lang="en-US" smtClean="0"/>
-              <a:t>9/1/2024</a:t>
+              <a:t>1/14/2025</a:t>
             </a:fld>
             <a:endParaRPr lang="en-US"/>
           </a:p>
@@ -2413,7 +2414,7 @@
           <a:p>
             <a:fld id="{CE8103EF-6A06-4AFC-A2C6-FF5735AE5867}" type="datetimeFigureOut">
               <a:rPr lang="en-US" smtClean="0"/>
-              <a:t>9/1/2024</a:t>
+              <a:t>1/14/2025</a:t>
             </a:fld>
             <a:endParaRPr lang="en-US"/>
           </a:p>
@@ -2702,7 +2703,7 @@
           <a:p>
             <a:fld id="{CE8103EF-6A06-4AFC-A2C6-FF5735AE5867}" type="datetimeFigureOut">
               <a:rPr lang="en-US" smtClean="0"/>
-              <a:t>9/1/2024</a:t>
+              <a:t>1/14/2025</a:t>
             </a:fld>
             <a:endParaRPr lang="en-US"/>
           </a:p>
@@ -2945,7 +2946,7 @@
           <a:p>
             <a:fld id="{CE8103EF-6A06-4AFC-A2C6-FF5735AE5867}" type="datetimeFigureOut">
               <a:rPr lang="en-US" smtClean="0"/>
-              <a:t>9/1/2024</a:t>
+              <a:t>1/14/2025</a:t>
             </a:fld>
             <a:endParaRPr lang="en-US"/>
           </a:p>
@@ -3348,6 +3349,579 @@
 <file path=ppt/slides/slide1.xml><?xml version="1.0" encoding="utf-8"?>
 <p:sld xmlns:a="http://schemas.openxmlformats.org/drawingml/2006/main" xmlns:r="http://schemas.openxmlformats.org/officeDocument/2006/relationships" xmlns:p="http://schemas.openxmlformats.org/presentationml/2006/main">
   <p:cSld>
+    <p:bg>
+      <p:bgPr>
+        <a:solidFill>
+          <a:schemeClr val="bg2">
+            <a:lumMod val="50000"/>
+          </a:schemeClr>
+        </a:solidFill>
+        <a:effectLst/>
+      </p:bgPr>
+    </p:bg>
+    <p:spTree>
+      <p:nvGrpSpPr>
+        <p:cNvPr id="1" name=""/>
+        <p:cNvGrpSpPr/>
+        <p:nvPr/>
+      </p:nvGrpSpPr>
+      <p:grpSpPr>
+        <a:xfrm>
+          <a:off x="0" y="0"/>
+          <a:ext cx="0" cy="0"/>
+          <a:chOff x="0" y="0"/>
+          <a:chExt cx="0" cy="0"/>
+        </a:xfrm>
+      </p:grpSpPr>
+      <p:pic>
+        <p:nvPicPr>
+          <p:cNvPr id="3" name="Grafik 2" descr="Ein Bild, das Schrift, Grafiken, Text, Grafikdesign enthält.&#10;&#10;Automatisch generierte Beschreibung">
+            <a:extLst>
+              <a:ext uri="{FF2B5EF4-FFF2-40B4-BE49-F238E27FC236}">
+                <a16:creationId xmlns:a16="http://schemas.microsoft.com/office/drawing/2014/main" id="{455BEB90-6115-17F0-07F2-8AAE37B7027D}"/>
+              </a:ext>
+            </a:extLst>
+          </p:cNvPr>
+          <p:cNvPicPr>
+            <a:picLocks noChangeAspect="1"/>
+          </p:cNvPicPr>
+          <p:nvPr/>
+        </p:nvPicPr>
+        <p:blipFill>
+          <a:blip r:embed="rId2">
+            <a:extLst>
+              <a:ext uri="{28A0092B-C50C-407E-A947-70E740481C1C}">
+                <a14:useLocalDpi xmlns:a14="http://schemas.microsoft.com/office/drawing/2010/main" val="0"/>
+              </a:ext>
+            </a:extLst>
+          </a:blip>
+          <a:stretch>
+            <a:fillRect/>
+          </a:stretch>
+        </p:blipFill>
+        <p:spPr>
+          <a:xfrm>
+            <a:off x="3115169" y="1382715"/>
+            <a:ext cx="4030349" cy="1151529"/>
+          </a:xfrm>
+          <a:prstGeom prst="rect">
+            <a:avLst/>
+          </a:prstGeom>
+        </p:spPr>
+      </p:pic>
+      <p:sp>
+        <p:nvSpPr>
+          <p:cNvPr id="4" name="Textfeld 3">
+            <a:extLst>
+              <a:ext uri="{FF2B5EF4-FFF2-40B4-BE49-F238E27FC236}">
+                <a16:creationId xmlns:a16="http://schemas.microsoft.com/office/drawing/2014/main" id="{88AE6C18-AD6C-B6B1-1B1C-9C53E33964EB}"/>
+              </a:ext>
+            </a:extLst>
+          </p:cNvPr>
+          <p:cNvSpPr txBox="1"/>
+          <p:nvPr/>
+        </p:nvSpPr>
+        <p:spPr>
+          <a:xfrm>
+            <a:off x="3115169" y="2875002"/>
+            <a:ext cx="5067297" cy="1107996"/>
+          </a:xfrm>
+          <a:prstGeom prst="rect">
+            <a:avLst/>
+          </a:prstGeom>
+          <a:solidFill>
+            <a:srgbClr val="101010"/>
+          </a:solidFill>
+        </p:spPr>
+        <p:txBody>
+          <a:bodyPr wrap="none" lIns="288000" rtlCol="0">
+            <a:noAutofit/>
+          </a:bodyPr>
+          <a:lstStyle/>
+          <a:p>
+            <a:r>
+              <a:rPr lang="de-DE" sz="6600" b="1" dirty="0">
+                <a:solidFill>
+                  <a:srgbClr val="D9D9D9"/>
+                </a:solidFill>
+                <a:latin typeface="Roboto Black" panose="02000000000000000000" pitchFamily="2" charset="0"/>
+                <a:ea typeface="Roboto Black" panose="02000000000000000000" pitchFamily="2" charset="0"/>
+              </a:rPr>
+              <a:t>Xoptfoil</a:t>
+            </a:r>
+          </a:p>
+        </p:txBody>
+      </p:sp>
+      <p:sp>
+        <p:nvSpPr>
+          <p:cNvPr id="5" name="Textfeld 4">
+            <a:extLst>
+              <a:ext uri="{FF2B5EF4-FFF2-40B4-BE49-F238E27FC236}">
+                <a16:creationId xmlns:a16="http://schemas.microsoft.com/office/drawing/2014/main" id="{516D9F68-55EA-89B5-B37B-3F6FBA25240E}"/>
+              </a:ext>
+            </a:extLst>
+          </p:cNvPr>
+          <p:cNvSpPr txBox="1"/>
+          <p:nvPr/>
+        </p:nvSpPr>
+        <p:spPr>
+          <a:xfrm>
+            <a:off x="3115168" y="4196326"/>
+            <a:ext cx="5265261" cy="1107996"/>
+          </a:xfrm>
+          <a:prstGeom prst="rect">
+            <a:avLst/>
+          </a:prstGeom>
+          <a:solidFill>
+            <a:srgbClr val="101010"/>
+          </a:solidFill>
+        </p:spPr>
+        <p:txBody>
+          <a:bodyPr wrap="none" lIns="288000" rtlCol="0">
+            <a:noAutofit/>
+          </a:bodyPr>
+          <a:lstStyle/>
+          <a:p>
+            <a:r>
+              <a:rPr lang="de-DE" sz="6600" b="1" dirty="0">
+                <a:solidFill>
+                  <a:srgbClr val="D9D9D9"/>
+                </a:solidFill>
+                <a:latin typeface="Roboto Black" panose="02000000000000000000" pitchFamily="2" charset="0"/>
+                <a:ea typeface="Roboto Black" panose="02000000000000000000" pitchFamily="2" charset="0"/>
+              </a:rPr>
+              <a:t>Airfoil</a:t>
+            </a:r>
+            <a:r>
+              <a:rPr lang="de-DE" sz="6600" b="1" dirty="0">
+                <a:solidFill>
+                  <a:srgbClr val="DA007D"/>
+                </a:solidFill>
+                <a:latin typeface="Roboto Black" panose="02000000000000000000" pitchFamily="2" charset="0"/>
+                <a:ea typeface="Roboto Black" panose="02000000000000000000" pitchFamily="2" charset="0"/>
+              </a:rPr>
+              <a:t>Editor</a:t>
+            </a:r>
+          </a:p>
+        </p:txBody>
+      </p:sp>
+    </p:spTree>
+    <p:extLst>
+      <p:ext uri="{BB962C8B-B14F-4D97-AF65-F5344CB8AC3E}">
+        <p14:creationId xmlns:p14="http://schemas.microsoft.com/office/powerpoint/2010/main" val="2102712342"/>
+      </p:ext>
+    </p:extLst>
+  </p:cSld>
+  <p:clrMapOvr>
+    <a:masterClrMapping/>
+  </p:clrMapOvr>
+</p:sld>
+</file>
+
+<file path=ppt/slides/slide2.xml><?xml version="1.0" encoding="utf-8"?>
+<p:sld xmlns:a="http://schemas.openxmlformats.org/drawingml/2006/main" xmlns:r="http://schemas.openxmlformats.org/officeDocument/2006/relationships" xmlns:p="http://schemas.openxmlformats.org/presentationml/2006/main">
+  <p:cSld>
+    <p:spTree>
+      <p:nvGrpSpPr>
+        <p:cNvPr id="1" name="">
+          <a:extLst>
+            <a:ext uri="{FF2B5EF4-FFF2-40B4-BE49-F238E27FC236}">
+              <a16:creationId xmlns:a16="http://schemas.microsoft.com/office/drawing/2014/main" id="{B22C1923-18A2-19FB-E666-97336C0E6A73}"/>
+            </a:ext>
+          </a:extLst>
+        </p:cNvPr>
+        <p:cNvGrpSpPr/>
+        <p:nvPr/>
+      </p:nvGrpSpPr>
+      <p:grpSpPr>
+        <a:xfrm>
+          <a:off x="0" y="0"/>
+          <a:ext cx="0" cy="0"/>
+          <a:chOff x="0" y="0"/>
+          <a:chExt cx="0" cy="0"/>
+        </a:xfrm>
+      </p:grpSpPr>
+      <p:pic>
+        <p:nvPicPr>
+          <p:cNvPr id="10" name="Grafik 9" descr="Ein Bild, das Screenshot, Text, Diagramm enthält.&#10;&#10;Automatisch generierte Beschreibung">
+            <a:extLst>
+              <a:ext uri="{FF2B5EF4-FFF2-40B4-BE49-F238E27FC236}">
+                <a16:creationId xmlns:a16="http://schemas.microsoft.com/office/drawing/2014/main" id="{78C36A17-93F4-C1C8-E83C-DEB088A8CE45}"/>
+              </a:ext>
+            </a:extLst>
+          </p:cNvPr>
+          <p:cNvPicPr>
+            <a:picLocks noChangeAspect="1"/>
+          </p:cNvPicPr>
+          <p:nvPr/>
+        </p:nvPicPr>
+        <p:blipFill>
+          <a:blip r:embed="rId2">
+            <a:extLst>
+              <a:ext uri="{28A0092B-C50C-407E-A947-70E740481C1C}">
+                <a14:useLocalDpi xmlns:a14="http://schemas.microsoft.com/office/drawing/2010/main" val="0"/>
+              </a:ext>
+            </a:extLst>
+          </a:blip>
+          <a:srcRect l="58106" t="46239" b="1731"/>
+          <a:stretch/>
+        </p:blipFill>
+        <p:spPr>
+          <a:xfrm>
+            <a:off x="2735580" y="1179147"/>
+            <a:ext cx="2635103" cy="1736597"/>
+          </a:xfrm>
+          <a:prstGeom prst="rect">
+            <a:avLst/>
+          </a:prstGeom>
+        </p:spPr>
+      </p:pic>
+      <p:sp>
+        <p:nvSpPr>
+          <p:cNvPr id="2" name="Textfeld 1">
+            <a:extLst>
+              <a:ext uri="{FF2B5EF4-FFF2-40B4-BE49-F238E27FC236}">
+                <a16:creationId xmlns:a16="http://schemas.microsoft.com/office/drawing/2014/main" id="{E481B723-64CE-6CD2-C126-C2EC26098A85}"/>
+              </a:ext>
+            </a:extLst>
+          </p:cNvPr>
+          <p:cNvSpPr txBox="1"/>
+          <p:nvPr/>
+        </p:nvSpPr>
+        <p:spPr>
+          <a:xfrm>
+            <a:off x="3230506" y="2755784"/>
+            <a:ext cx="1610917" cy="591424"/>
+          </a:xfrm>
+          <a:prstGeom prst="rect">
+            <a:avLst/>
+          </a:prstGeom>
+          <a:solidFill>
+            <a:schemeClr val="bg1">
+              <a:lumMod val="85000"/>
+            </a:schemeClr>
+          </a:solidFill>
+          <a:effectLst>
+            <a:outerShdw blurRad="50800" dist="38100" dir="2700000" algn="tl" rotWithShape="0">
+              <a:prstClr val="black">
+                <a:alpha val="40000"/>
+              </a:prstClr>
+            </a:outerShdw>
+          </a:effectLst>
+        </p:spPr>
+        <p:txBody>
+          <a:bodyPr wrap="none" lIns="0" tIns="36000" rIns="0" bIns="36000" rtlCol="0" anchor="ctr">
+            <a:noAutofit/>
+          </a:bodyPr>
+          <a:lstStyle/>
+          <a:p>
+            <a:pPr algn="ctr"/>
+            <a:r>
+              <a:rPr lang="de-DE" b="1" dirty="0">
+                <a:solidFill>
+                  <a:schemeClr val="tx1">
+                    <a:lumMod val="50000"/>
+                    <a:lumOff val="50000"/>
+                  </a:schemeClr>
+                </a:solidFill>
+                <a:latin typeface="Roboto Black" panose="02000000000000000000" pitchFamily="2" charset="0"/>
+                <a:ea typeface="Roboto Black" panose="02000000000000000000" pitchFamily="2" charset="0"/>
+              </a:rPr>
+              <a:t>Airfoil</a:t>
+            </a:r>
+            <a:r>
+              <a:rPr lang="de-DE" b="1" dirty="0">
+                <a:solidFill>
+                  <a:srgbClr val="DA007D"/>
+                </a:solidFill>
+                <a:latin typeface="Roboto Black" panose="02000000000000000000" pitchFamily="2" charset="0"/>
+                <a:ea typeface="Roboto Black" panose="02000000000000000000" pitchFamily="2" charset="0"/>
+              </a:rPr>
+              <a:t>Editor</a:t>
+            </a:r>
+          </a:p>
+        </p:txBody>
+      </p:sp>
+      <p:sp>
+        <p:nvSpPr>
+          <p:cNvPr id="22" name="Textfeld 21">
+            <a:extLst>
+              <a:ext uri="{FF2B5EF4-FFF2-40B4-BE49-F238E27FC236}">
+                <a16:creationId xmlns:a16="http://schemas.microsoft.com/office/drawing/2014/main" id="{5402AD51-D9EA-CF78-346D-A51253A58946}"/>
+              </a:ext>
+            </a:extLst>
+          </p:cNvPr>
+          <p:cNvSpPr txBox="1"/>
+          <p:nvPr/>
+        </p:nvSpPr>
+        <p:spPr>
+          <a:xfrm>
+            <a:off x="3929948" y="3515121"/>
+            <a:ext cx="913226" cy="230832"/>
+          </a:xfrm>
+          <a:prstGeom prst="rect">
+            <a:avLst/>
+          </a:prstGeom>
+          <a:noFill/>
+        </p:spPr>
+        <p:txBody>
+          <a:bodyPr wrap="square" rtlCol="0">
+            <a:spAutoFit/>
+          </a:bodyPr>
+          <a:lstStyle/>
+          <a:p>
+            <a:pPr algn="r"/>
+            <a:r>
+              <a:rPr lang="de-DE" sz="900" dirty="0">
+                <a:solidFill>
+                  <a:schemeClr val="tx1">
+                    <a:lumMod val="65000"/>
+                    <a:lumOff val="35000"/>
+                  </a:schemeClr>
+                </a:solidFill>
+                <a:latin typeface="Roboto" panose="02000000000000000000" pitchFamily="2" charset="0"/>
+                <a:ea typeface="Roboto" panose="02000000000000000000" pitchFamily="2" charset="0"/>
+                <a:cs typeface="Roboto" panose="02000000000000000000" pitchFamily="2" charset="0"/>
+              </a:rPr>
+              <a:t>Xfoil </a:t>
+            </a:r>
+            <a:r>
+              <a:rPr lang="de-DE" sz="900" dirty="0" err="1">
+                <a:solidFill>
+                  <a:schemeClr val="tx1">
+                    <a:lumMod val="65000"/>
+                    <a:lumOff val="35000"/>
+                  </a:schemeClr>
+                </a:solidFill>
+                <a:latin typeface="Roboto" panose="02000000000000000000" pitchFamily="2" charset="0"/>
+                <a:ea typeface="Roboto" panose="02000000000000000000" pitchFamily="2" charset="0"/>
+                <a:cs typeface="Roboto" panose="02000000000000000000" pitchFamily="2" charset="0"/>
+              </a:rPr>
+              <a:t>Polars</a:t>
+            </a:r>
+            <a:endParaRPr lang="en-US" sz="900" dirty="0">
+              <a:solidFill>
+                <a:schemeClr val="tx1">
+                  <a:lumMod val="65000"/>
+                  <a:lumOff val="35000"/>
+                </a:schemeClr>
+              </a:solidFill>
+              <a:latin typeface="Roboto" panose="02000000000000000000" pitchFamily="2" charset="0"/>
+              <a:ea typeface="Roboto" panose="02000000000000000000" pitchFamily="2" charset="0"/>
+              <a:cs typeface="Roboto" panose="02000000000000000000" pitchFamily="2" charset="0"/>
+            </a:endParaRPr>
+          </a:p>
+        </p:txBody>
+      </p:sp>
+      <p:cxnSp>
+        <p:nvCxnSpPr>
+          <p:cNvPr id="29" name="Gerade Verbindung mit Pfeil 28">
+            <a:extLst>
+              <a:ext uri="{FF2B5EF4-FFF2-40B4-BE49-F238E27FC236}">
+                <a16:creationId xmlns:a16="http://schemas.microsoft.com/office/drawing/2014/main" id="{A0A33CC2-7741-D29F-6C48-2B7EE19376AE}"/>
+              </a:ext>
+            </a:extLst>
+          </p:cNvPr>
+          <p:cNvCxnSpPr>
+            <a:cxnSpLocks/>
+          </p:cNvCxnSpPr>
+          <p:nvPr/>
+        </p:nvCxnSpPr>
+        <p:spPr>
+          <a:xfrm>
+            <a:off x="4934250" y="3368092"/>
+            <a:ext cx="335456" cy="175171"/>
+          </a:xfrm>
+          <a:prstGeom prst="straightConnector1">
+            <a:avLst/>
+          </a:prstGeom>
+          <a:ln w="12700">
+            <a:solidFill>
+              <a:schemeClr val="bg1">
+                <a:lumMod val="65000"/>
+              </a:schemeClr>
+            </a:solidFill>
+            <a:prstDash val="sysDash"/>
+            <a:headEnd type="none" w="med" len="med"/>
+            <a:tailEnd type="triangle" w="lg" len="lg"/>
+          </a:ln>
+        </p:spPr>
+        <p:style>
+          <a:lnRef idx="2">
+            <a:schemeClr val="accent1"/>
+          </a:lnRef>
+          <a:fillRef idx="0">
+            <a:schemeClr val="accent1"/>
+          </a:fillRef>
+          <a:effectRef idx="1">
+            <a:schemeClr val="accent1"/>
+          </a:effectRef>
+          <a:fontRef idx="minor">
+            <a:schemeClr val="tx1"/>
+          </a:fontRef>
+        </p:style>
+      </p:cxnSp>
+      <p:sp>
+        <p:nvSpPr>
+          <p:cNvPr id="30" name="Textfeld 29">
+            <a:extLst>
+              <a:ext uri="{FF2B5EF4-FFF2-40B4-BE49-F238E27FC236}">
+                <a16:creationId xmlns:a16="http://schemas.microsoft.com/office/drawing/2014/main" id="{03F469C6-9A7B-AA24-EEA5-BA4CA1872678}"/>
+              </a:ext>
+            </a:extLst>
+          </p:cNvPr>
+          <p:cNvSpPr txBox="1"/>
+          <p:nvPr/>
+        </p:nvSpPr>
+        <p:spPr>
+          <a:xfrm>
+            <a:off x="5308795" y="3303495"/>
+            <a:ext cx="945343" cy="645428"/>
+          </a:xfrm>
+          <a:prstGeom prst="rect">
+            <a:avLst/>
+          </a:prstGeom>
+          <a:solidFill>
+            <a:srgbClr val="ECECEC"/>
+          </a:solidFill>
+          <a:effectLst>
+            <a:outerShdw blurRad="50800" dist="38100" dir="2700000" algn="tl" rotWithShape="0">
+              <a:prstClr val="black">
+                <a:alpha val="40000"/>
+              </a:prstClr>
+            </a:outerShdw>
+          </a:effectLst>
+        </p:spPr>
+        <p:txBody>
+          <a:bodyPr wrap="none" lIns="0" tIns="36000" rIns="0" bIns="36000" rtlCol="0" anchor="t">
+            <a:noAutofit/>
+          </a:bodyPr>
+          <a:lstStyle/>
+          <a:p>
+            <a:pPr algn="ctr"/>
+            <a:r>
+              <a:rPr lang="de-DE" sz="1100" b="1" dirty="0">
+                <a:solidFill>
+                  <a:srgbClr val="DA007D"/>
+                </a:solidFill>
+                <a:latin typeface="Roboto Black" panose="02000000000000000000" pitchFamily="2" charset="0"/>
+                <a:ea typeface="Roboto Black" panose="02000000000000000000" pitchFamily="2" charset="0"/>
+              </a:rPr>
+              <a:t>Worker</a:t>
+            </a:r>
+          </a:p>
+        </p:txBody>
+      </p:sp>
+      <p:sp>
+        <p:nvSpPr>
+          <p:cNvPr id="19" name="Textfeld 18">
+            <a:extLst>
+              <a:ext uri="{FF2B5EF4-FFF2-40B4-BE49-F238E27FC236}">
+                <a16:creationId xmlns:a16="http://schemas.microsoft.com/office/drawing/2014/main" id="{BEF5B32F-AB91-D655-1F15-A2043150CF18}"/>
+              </a:ext>
+            </a:extLst>
+          </p:cNvPr>
+          <p:cNvSpPr txBox="1"/>
+          <p:nvPr/>
+        </p:nvSpPr>
+        <p:spPr>
+          <a:xfrm>
+            <a:off x="5385628" y="3543263"/>
+            <a:ext cx="818503" cy="348509"/>
+          </a:xfrm>
+          <a:prstGeom prst="rect">
+            <a:avLst/>
+          </a:prstGeom>
+          <a:solidFill>
+            <a:schemeClr val="bg1">
+              <a:alpha val="74000"/>
+            </a:schemeClr>
+          </a:solidFill>
+          <a:effectLst/>
+        </p:spPr>
+        <p:txBody>
+          <a:bodyPr wrap="none" lIns="0" tIns="36000" rIns="0" bIns="36000" rtlCol="0" anchor="ctr">
+            <a:noAutofit/>
+          </a:bodyPr>
+          <a:lstStyle/>
+          <a:p>
+            <a:pPr algn="ctr"/>
+            <a:r>
+              <a:rPr lang="de-DE" sz="1100" b="1" dirty="0">
+                <a:solidFill>
+                  <a:schemeClr val="accent3"/>
+                </a:solidFill>
+                <a:latin typeface="Roboto Black" panose="02000000000000000000" pitchFamily="2" charset="0"/>
+                <a:ea typeface="Roboto Black" panose="02000000000000000000" pitchFamily="2" charset="0"/>
+              </a:rPr>
+              <a:t>Xfoil</a:t>
+            </a:r>
+          </a:p>
+        </p:txBody>
+      </p:sp>
+      <p:cxnSp>
+        <p:nvCxnSpPr>
+          <p:cNvPr id="6" name="Gerade Verbindung mit Pfeil 5">
+            <a:extLst>
+              <a:ext uri="{FF2B5EF4-FFF2-40B4-BE49-F238E27FC236}">
+                <a16:creationId xmlns:a16="http://schemas.microsoft.com/office/drawing/2014/main" id="{0AC3C85C-C658-01E5-2F18-8333367475B2}"/>
+              </a:ext>
+            </a:extLst>
+          </p:cNvPr>
+          <p:cNvCxnSpPr>
+            <a:cxnSpLocks/>
+          </p:cNvCxnSpPr>
+          <p:nvPr/>
+        </p:nvCxnSpPr>
+        <p:spPr>
+          <a:xfrm flipH="1" flipV="1">
+            <a:off x="4815435" y="3467861"/>
+            <a:ext cx="397750" cy="241999"/>
+          </a:xfrm>
+          <a:prstGeom prst="straightConnector1">
+            <a:avLst/>
+          </a:prstGeom>
+          <a:ln w="38100">
+            <a:solidFill>
+              <a:schemeClr val="bg1">
+                <a:lumMod val="65000"/>
+              </a:schemeClr>
+            </a:solidFill>
+            <a:headEnd type="none" w="med" len="med"/>
+            <a:tailEnd type="triangle" w="lg" len="lg"/>
+          </a:ln>
+        </p:spPr>
+        <p:style>
+          <a:lnRef idx="2">
+            <a:schemeClr val="accent1"/>
+          </a:lnRef>
+          <a:fillRef idx="0">
+            <a:schemeClr val="accent1"/>
+          </a:fillRef>
+          <a:effectRef idx="1">
+            <a:schemeClr val="accent1"/>
+          </a:effectRef>
+          <a:fontRef idx="minor">
+            <a:schemeClr val="tx1"/>
+          </a:fontRef>
+        </p:style>
+      </p:cxnSp>
+    </p:spTree>
+    <p:extLst>
+      <p:ext uri="{BB962C8B-B14F-4D97-AF65-F5344CB8AC3E}">
+        <p14:creationId xmlns:p14="http://schemas.microsoft.com/office/powerpoint/2010/main" val="923941560"/>
+      </p:ext>
+    </p:extLst>
+  </p:cSld>
+  <p:clrMapOvr>
+    <a:masterClrMapping/>
+  </p:clrMapOvr>
+</p:sld>
+</file>
+
+<file path=ppt/slides/slide3.xml><?xml version="1.0" encoding="utf-8"?>
+<p:sld xmlns:a="http://schemas.openxmlformats.org/drawingml/2006/main" xmlns:r="http://schemas.openxmlformats.org/officeDocument/2006/relationships" xmlns:p="http://schemas.openxmlformats.org/presentationml/2006/main">
+  <p:cSld>
     <p:spTree>
       <p:nvGrpSpPr>
         <p:cNvPr id="1" name=""/>
@@ -9641,7 +10215,7 @@
 </p:sld>
 </file>
 
-<file path=ppt/slides/slide2.xml><?xml version="1.0" encoding="utf-8"?>
+<file path=ppt/slides/slide4.xml><?xml version="1.0" encoding="utf-8"?>
 <p:sld xmlns:a="http://schemas.openxmlformats.org/drawingml/2006/main" xmlns:r="http://schemas.openxmlformats.org/officeDocument/2006/relationships" xmlns:p="http://schemas.openxmlformats.org/presentationml/2006/main">
   <p:cSld>
     <p:spTree>
@@ -15428,7 +16002,7 @@
 </p:sld>
 </file>
 
-<file path=ppt/slides/slide3.xml><?xml version="1.0" encoding="utf-8"?>
+<file path=ppt/slides/slide5.xml><?xml version="1.0" encoding="utf-8"?>
 <p:sld xmlns:a="http://schemas.openxmlformats.org/drawingml/2006/main" xmlns:r="http://schemas.openxmlformats.org/officeDocument/2006/relationships" xmlns:p="http://schemas.openxmlformats.org/presentationml/2006/main">
   <p:cSld>
     <p:spTree>
@@ -17224,7 +17798,7 @@
 </p:sld>
 </file>
 
-<file path=ppt/slides/slide4.xml><?xml version="1.0" encoding="utf-8"?>
+<file path=ppt/slides/slide6.xml><?xml version="1.0" encoding="utf-8"?>
 <p:sld xmlns:a="http://schemas.openxmlformats.org/drawingml/2006/main" xmlns:r="http://schemas.openxmlformats.org/officeDocument/2006/relationships" xmlns:p="http://schemas.openxmlformats.org/presentationml/2006/main">
   <p:cSld>
     <p:spTree>
@@ -18557,178 +19131,6 @@
     <p:extLst>
       <p:ext uri="{BB962C8B-B14F-4D97-AF65-F5344CB8AC3E}">
         <p14:creationId xmlns:p14="http://schemas.microsoft.com/office/powerpoint/2010/main" val="2933256252"/>
-      </p:ext>
-    </p:extLst>
-  </p:cSld>
-  <p:clrMapOvr>
-    <a:masterClrMapping/>
-  </p:clrMapOvr>
-</p:sld>
-</file>
-
-<file path=ppt/slides/slide5.xml><?xml version="1.0" encoding="utf-8"?>
-<p:sld xmlns:a="http://schemas.openxmlformats.org/drawingml/2006/main" xmlns:r="http://schemas.openxmlformats.org/officeDocument/2006/relationships" xmlns:p="http://schemas.openxmlformats.org/presentationml/2006/main">
-  <p:cSld>
-    <p:bg>
-      <p:bgPr>
-        <a:solidFill>
-          <a:schemeClr val="bg2">
-            <a:lumMod val="50000"/>
-          </a:schemeClr>
-        </a:solidFill>
-        <a:effectLst/>
-      </p:bgPr>
-    </p:bg>
-    <p:spTree>
-      <p:nvGrpSpPr>
-        <p:cNvPr id="1" name=""/>
-        <p:cNvGrpSpPr/>
-        <p:nvPr/>
-      </p:nvGrpSpPr>
-      <p:grpSpPr>
-        <a:xfrm>
-          <a:off x="0" y="0"/>
-          <a:ext cx="0" cy="0"/>
-          <a:chOff x="0" y="0"/>
-          <a:chExt cx="0" cy="0"/>
-        </a:xfrm>
-      </p:grpSpPr>
-      <p:pic>
-        <p:nvPicPr>
-          <p:cNvPr id="3" name="Grafik 2" descr="Ein Bild, das Schrift, Grafiken, Text, Grafikdesign enthält.&#10;&#10;Automatisch generierte Beschreibung">
-            <a:extLst>
-              <a:ext uri="{FF2B5EF4-FFF2-40B4-BE49-F238E27FC236}">
-                <a16:creationId xmlns:a16="http://schemas.microsoft.com/office/drawing/2014/main" id="{455BEB90-6115-17F0-07F2-8AAE37B7027D}"/>
-              </a:ext>
-            </a:extLst>
-          </p:cNvPr>
-          <p:cNvPicPr>
-            <a:picLocks noChangeAspect="1"/>
-          </p:cNvPicPr>
-          <p:nvPr/>
-        </p:nvPicPr>
-        <p:blipFill>
-          <a:blip r:embed="rId2">
-            <a:extLst>
-              <a:ext uri="{28A0092B-C50C-407E-A947-70E740481C1C}">
-                <a14:useLocalDpi xmlns:a14="http://schemas.microsoft.com/office/drawing/2010/main" val="0"/>
-              </a:ext>
-            </a:extLst>
-          </a:blip>
-          <a:stretch>
-            <a:fillRect/>
-          </a:stretch>
-        </p:blipFill>
-        <p:spPr>
-          <a:xfrm>
-            <a:off x="3115169" y="1382715"/>
-            <a:ext cx="4030349" cy="1151529"/>
-          </a:xfrm>
-          <a:prstGeom prst="rect">
-            <a:avLst/>
-          </a:prstGeom>
-        </p:spPr>
-      </p:pic>
-      <p:sp>
-        <p:nvSpPr>
-          <p:cNvPr id="4" name="Textfeld 3">
-            <a:extLst>
-              <a:ext uri="{FF2B5EF4-FFF2-40B4-BE49-F238E27FC236}">
-                <a16:creationId xmlns:a16="http://schemas.microsoft.com/office/drawing/2014/main" id="{88AE6C18-AD6C-B6B1-1B1C-9C53E33964EB}"/>
-              </a:ext>
-            </a:extLst>
-          </p:cNvPr>
-          <p:cNvSpPr txBox="1"/>
-          <p:nvPr/>
-        </p:nvSpPr>
-        <p:spPr>
-          <a:xfrm>
-            <a:off x="3115169" y="2875002"/>
-            <a:ext cx="5067297" cy="1107996"/>
-          </a:xfrm>
-          <a:prstGeom prst="rect">
-            <a:avLst/>
-          </a:prstGeom>
-          <a:solidFill>
-            <a:srgbClr val="101010"/>
-          </a:solidFill>
-        </p:spPr>
-        <p:txBody>
-          <a:bodyPr wrap="none" lIns="288000" rtlCol="0">
-            <a:noAutofit/>
-          </a:bodyPr>
-          <a:lstStyle/>
-          <a:p>
-            <a:r>
-              <a:rPr lang="de-DE" sz="6600" b="1" dirty="0">
-                <a:solidFill>
-                  <a:srgbClr val="D9D9D9"/>
-                </a:solidFill>
-                <a:latin typeface="Roboto Black" panose="02000000000000000000" pitchFamily="2" charset="0"/>
-                <a:ea typeface="Roboto Black" panose="02000000000000000000" pitchFamily="2" charset="0"/>
-              </a:rPr>
-              <a:t>Xoptfoil</a:t>
-            </a:r>
-          </a:p>
-        </p:txBody>
-      </p:sp>
-      <p:sp>
-        <p:nvSpPr>
-          <p:cNvPr id="5" name="Textfeld 4">
-            <a:extLst>
-              <a:ext uri="{FF2B5EF4-FFF2-40B4-BE49-F238E27FC236}">
-                <a16:creationId xmlns:a16="http://schemas.microsoft.com/office/drawing/2014/main" id="{516D9F68-55EA-89B5-B37B-3F6FBA25240E}"/>
-              </a:ext>
-            </a:extLst>
-          </p:cNvPr>
-          <p:cNvSpPr txBox="1"/>
-          <p:nvPr/>
-        </p:nvSpPr>
-        <p:spPr>
-          <a:xfrm>
-            <a:off x="3115168" y="4196326"/>
-            <a:ext cx="5265261" cy="1107996"/>
-          </a:xfrm>
-          <a:prstGeom prst="rect">
-            <a:avLst/>
-          </a:prstGeom>
-          <a:solidFill>
-            <a:srgbClr val="101010"/>
-          </a:solidFill>
-        </p:spPr>
-        <p:txBody>
-          <a:bodyPr wrap="none" lIns="288000" rtlCol="0">
-            <a:noAutofit/>
-          </a:bodyPr>
-          <a:lstStyle/>
-          <a:p>
-            <a:r>
-              <a:rPr lang="de-DE" sz="6600" b="1" dirty="0">
-                <a:solidFill>
-                  <a:srgbClr val="D9D9D9"/>
-                </a:solidFill>
-                <a:latin typeface="Roboto Black" panose="02000000000000000000" pitchFamily="2" charset="0"/>
-                <a:ea typeface="Roboto Black" panose="02000000000000000000" pitchFamily="2" charset="0"/>
-              </a:rPr>
-              <a:t>Airfoil</a:t>
-            </a:r>
-            <a:r>
-              <a:rPr lang="de-DE" sz="6600" b="1" dirty="0">
-                <a:solidFill>
-                  <a:srgbClr val="DA007D"/>
-                </a:solidFill>
-                <a:latin typeface="Roboto Black" panose="02000000000000000000" pitchFamily="2" charset="0"/>
-                <a:ea typeface="Roboto Black" panose="02000000000000000000" pitchFamily="2" charset="0"/>
-              </a:rPr>
-              <a:t>Editor</a:t>
-            </a:r>
-          </a:p>
-        </p:txBody>
-      </p:sp>
-    </p:spTree>
-    <p:extLst>
-      <p:ext uri="{BB962C8B-B14F-4D97-AF65-F5344CB8AC3E}">
-        <p14:creationId xmlns:p14="http://schemas.microsoft.com/office/powerpoint/2010/main" val="2102712342"/>
       </p:ext>
     </p:extLst>
   </p:cSld>

</xml_diff>